<commit_message>
completed Week05 with example code
</commit_message>
<xml_diff>
--- a/Week04/Navigation with UIKit.pptx
+++ b/Week04/Navigation with UIKit.pptx
@@ -5,10 +5,10 @@
     <p:sldMasterId id="2147483648" r:id="rId1"/>
   </p:sldMasterIdLst>
   <p:notesMasterIdLst>
-    <p:notesMasterId r:id="rId11"/>
+    <p:notesMasterId r:id="rId12"/>
   </p:notesMasterIdLst>
   <p:handoutMasterIdLst>
-    <p:handoutMasterId r:id="rId12"/>
+    <p:handoutMasterId r:id="rId13"/>
   </p:handoutMasterIdLst>
   <p:sldIdLst>
     <p:sldId id="257" r:id="rId3"/>
@@ -18,7 +18,8 @@
     <p:sldId id="314" r:id="rId7"/>
     <p:sldId id="316" r:id="rId8"/>
     <p:sldId id="315" r:id="rId9"/>
-    <p:sldId id="308" r:id="rId10"/>
+    <p:sldId id="318" r:id="rId10"/>
+    <p:sldId id="308" r:id="rId11"/>
   </p:sldIdLst>
   <p:sldSz cx="12192000" cy="6858000"/>
   <p:notesSz cx="6858000" cy="9144000"/>
@@ -7149,6 +7150,121 @@
         </p:nvSpPr>
         <p:spPr>
           <a:xfrm>
+            <a:off x="2359025" y="3429000"/>
+            <a:ext cx="7660640" cy="922020"/>
+          </a:xfrm>
+          <a:prstGeom prst="rect">
+            <a:avLst/>
+          </a:prstGeom>
+        </p:spPr>
+        <p:txBody>
+          <a:bodyPr wrap="square">
+            <a:spAutoFit/>
+          </a:bodyPr>
+          <a:p>
+            <a:pPr marL="0" indent="0" algn="ctr"/>
+            <a:r>
+              <a:rPr lang="en-US" altLang="en-US" sz="5400" b="0" i="0">
+                <a:solidFill>
+                  <a:srgbClr val="F8FAFF"/>
+                </a:solidFill>
+                <a:latin typeface="Microsoft YaHei" charset="0"/>
+                <a:ea typeface="quote-cjk-patch"/>
+                <a:cs typeface="Microsoft YaHei" charset="0"/>
+              </a:rPr>
+              <a:t> </a:t>
+            </a:r>
+            <a:r>
+              <a:rPr lang="en-US" altLang="en-US" sz="5400" b="0" i="0">
+                <a:solidFill>
+                  <a:srgbClr val="F8FAFF"/>
+                </a:solidFill>
+                <a:latin typeface="Microsoft YaHei" charset="0"/>
+                <a:ea typeface="quote-cjk-patch"/>
+                <a:cs typeface="Microsoft YaHei" charset="0"/>
+                <a:hlinkClick r:id="rId3" action="ppaction://hlinkfile"/>
+              </a:rPr>
+              <a:t>Homework</a:t>
+            </a:r>
+            <a:endParaRPr lang="en-US" altLang="en-US" sz="5400" b="0" i="0">
+              <a:solidFill>
+                <a:srgbClr val="F8FAFF"/>
+              </a:solidFill>
+              <a:latin typeface="Microsoft YaHei" charset="0"/>
+              <a:ea typeface="quote-cjk-patch"/>
+              <a:cs typeface="Microsoft YaHei" charset="0"/>
+            </a:endParaRPr>
+          </a:p>
+        </p:txBody>
+      </p:sp>
+    </p:spTree>
+  </p:cSld>
+  <p:clrMapOvr>
+    <a:masterClrMapping/>
+  </p:clrMapOvr>
+  <p:transition spd="slow">
+    <p:wipe/>
+  </p:transition>
+</p:sld>
+</file>
+
+<file path=ppt/slides/slide9.xml><?xml version="1.0" encoding="utf-8"?>
+<p:sld xmlns:a="http://schemas.openxmlformats.org/drawingml/2006/main" xmlns:r="http://schemas.openxmlformats.org/officeDocument/2006/relationships" xmlns:p="http://schemas.openxmlformats.org/presentationml/2006/main">
+  <p:cSld>
+    <p:bg>
+      <p:bgPr>
+        <a:blipFill>
+          <a:blip r:embed="rId1"/>
+          <a:stretch>
+            <a:fillRect/>
+          </a:stretch>
+        </a:blipFill>
+        <a:effectLst/>
+      </p:bgPr>
+    </p:bg>
+    <p:spTree>
+      <p:nvGrpSpPr>
+        <p:cNvPr id="1" name=""/>
+        <p:cNvGrpSpPr/>
+        <p:nvPr/>
+      </p:nvGrpSpPr>
+      <p:grpSpPr/>
+      <p:pic>
+        <p:nvPicPr>
+          <p:cNvPr id="5121" name="图片 3"/>
+          <p:cNvPicPr>
+            <a:picLocks noChangeAspect="1"/>
+          </p:cNvPicPr>
+          <p:nvPr/>
+        </p:nvPicPr>
+        <p:blipFill>
+          <a:blip r:embed="rId2"/>
+          <a:stretch>
+            <a:fillRect/>
+          </a:stretch>
+        </p:blipFill>
+        <p:spPr>
+          <a:xfrm>
+            <a:off x="0" y="0"/>
+            <a:ext cx="12192000" cy="6858000"/>
+          </a:xfrm>
+          <a:prstGeom prst="rect">
+            <a:avLst/>
+          </a:prstGeom>
+          <a:noFill/>
+          <a:ln w="9525">
+            <a:noFill/>
+          </a:ln>
+        </p:spPr>
+      </p:pic>
+      <p:sp>
+        <p:nvSpPr>
+          <p:cNvPr id="11" name="Text Box 10"/>
+          <p:cNvSpPr txBox="1"/>
+          <p:nvPr/>
+        </p:nvSpPr>
+        <p:spPr>
+          <a:xfrm>
             <a:off x="1016000" y="902970"/>
             <a:ext cx="6060440" cy="460375"/>
           </a:xfrm>
@@ -7225,7 +7341,7 @@
                   <a:srgbClr val="FF0000"/>
                 </a:solidFill>
               </a:rPr>
-              <a:t>Navigation - Moving between multiple screens!</a:t>
+              <a:t>UITableView Fundamentals..~</a:t>
             </a:r>
             <a:endParaRPr lang="en-US" altLang="en-US" sz="1800">
               <a:solidFill>

</xml_diff>